<commit_message>
Task 2 Executive Summary Preliminary Update
</commit_message>
<xml_diff>
--- a/Task2-ExecutiveSummary/ExecutiveSummary.pptx
+++ b/Task2-ExecutiveSummary/ExecutiveSummary.pptx
@@ -5726,7 +5726,7 @@
           <a:p>
             <a:fld id="{F348C013-97A7-460A-A0BC-E4EB2D5CC9FA}" type="datetimeFigureOut">
               <a:rPr lang="en-US" smtClean="0"/>
-              <a:t>9/27/2020</a:t>
+              <a:t>9/29/2020</a:t>
             </a:fld>
             <a:endParaRPr lang="en-US"/>
           </a:p>
@@ -5924,7 +5924,7 @@
           <a:p>
             <a:fld id="{F348C013-97A7-460A-A0BC-E4EB2D5CC9FA}" type="datetimeFigureOut">
               <a:rPr lang="en-US" smtClean="0"/>
-              <a:t>9/27/2020</a:t>
+              <a:t>9/29/2020</a:t>
             </a:fld>
             <a:endParaRPr lang="en-US"/>
           </a:p>
@@ -6132,7 +6132,7 @@
           <a:p>
             <a:fld id="{F348C013-97A7-460A-A0BC-E4EB2D5CC9FA}" type="datetimeFigureOut">
               <a:rPr lang="en-US" smtClean="0"/>
-              <a:t>9/27/2020</a:t>
+              <a:t>9/29/2020</a:t>
             </a:fld>
             <a:endParaRPr lang="en-US"/>
           </a:p>
@@ -6330,7 +6330,7 @@
           <a:p>
             <a:fld id="{F348C013-97A7-460A-A0BC-E4EB2D5CC9FA}" type="datetimeFigureOut">
               <a:rPr lang="en-US" smtClean="0"/>
-              <a:t>9/27/2020</a:t>
+              <a:t>9/29/2020</a:t>
             </a:fld>
             <a:endParaRPr lang="en-US"/>
           </a:p>
@@ -6605,7 +6605,7 @@
           <a:p>
             <a:fld id="{F348C013-97A7-460A-A0BC-E4EB2D5CC9FA}" type="datetimeFigureOut">
               <a:rPr lang="en-US" smtClean="0"/>
-              <a:t>9/27/2020</a:t>
+              <a:t>9/29/2020</a:t>
             </a:fld>
             <a:endParaRPr lang="en-US"/>
           </a:p>
@@ -6870,7 +6870,7 @@
           <a:p>
             <a:fld id="{F348C013-97A7-460A-A0BC-E4EB2D5CC9FA}" type="datetimeFigureOut">
               <a:rPr lang="en-US" smtClean="0"/>
-              <a:t>9/27/2020</a:t>
+              <a:t>9/29/2020</a:t>
             </a:fld>
             <a:endParaRPr lang="en-US"/>
           </a:p>
@@ -7282,7 +7282,7 @@
           <a:p>
             <a:fld id="{F348C013-97A7-460A-A0BC-E4EB2D5CC9FA}" type="datetimeFigureOut">
               <a:rPr lang="en-US" smtClean="0"/>
-              <a:t>9/27/2020</a:t>
+              <a:t>9/29/2020</a:t>
             </a:fld>
             <a:endParaRPr lang="en-US"/>
           </a:p>
@@ -7423,7 +7423,7 @@
           <a:p>
             <a:fld id="{F348C013-97A7-460A-A0BC-E4EB2D5CC9FA}" type="datetimeFigureOut">
               <a:rPr lang="en-US" smtClean="0"/>
-              <a:t>9/27/2020</a:t>
+              <a:t>9/29/2020</a:t>
             </a:fld>
             <a:endParaRPr lang="en-US"/>
           </a:p>
@@ -7536,7 +7536,7 @@
           <a:p>
             <a:fld id="{F348C013-97A7-460A-A0BC-E4EB2D5CC9FA}" type="datetimeFigureOut">
               <a:rPr lang="en-US" smtClean="0"/>
-              <a:t>9/27/2020</a:t>
+              <a:t>9/29/2020</a:t>
             </a:fld>
             <a:endParaRPr lang="en-US"/>
           </a:p>
@@ -7847,7 +7847,7 @@
           <a:p>
             <a:fld id="{F348C013-97A7-460A-A0BC-E4EB2D5CC9FA}" type="datetimeFigureOut">
               <a:rPr lang="en-US" smtClean="0"/>
-              <a:t>9/27/2020</a:t>
+              <a:t>9/29/2020</a:t>
             </a:fld>
             <a:endParaRPr lang="en-US"/>
           </a:p>
@@ -8135,7 +8135,7 @@
           <a:p>
             <a:fld id="{F348C013-97A7-460A-A0BC-E4EB2D5CC9FA}" type="datetimeFigureOut">
               <a:rPr lang="en-US" smtClean="0"/>
-              <a:t>9/27/2020</a:t>
+              <a:t>9/29/2020</a:t>
             </a:fld>
             <a:endParaRPr lang="en-US"/>
           </a:p>
@@ -8376,7 +8376,7 @@
           <a:p>
             <a:fld id="{F348C013-97A7-460A-A0BC-E4EB2D5CC9FA}" type="datetimeFigureOut">
               <a:rPr lang="en-US" smtClean="0"/>
-              <a:t>9/27/2020</a:t>
+              <a:t>9/29/2020</a:t>
             </a:fld>
             <a:endParaRPr lang="en-US"/>
           </a:p>
@@ -8866,30 +8866,36 @@
         </p:spPr>
         <p:txBody>
           <a:bodyPr>
-            <a:normAutofit fontScale="92500" lnSpcReduction="10000"/>
+            <a:normAutofit fontScale="62500" lnSpcReduction="20000"/>
           </a:bodyPr>
           <a:lstStyle/>
           <a:p>
             <a:pPr algn="l"/>
             <a:r>
-              <a:rPr lang="en-US"/>
+              <a:rPr lang="en-US" dirty="0"/>
+              <a:t>Task: 2 Executive Summary</a:t>
+            </a:r>
+          </a:p>
+          <a:p>
+            <a:pPr algn="l"/>
+            <a:r>
+              <a:rPr lang="en-US" dirty="0"/>
               <a:t>Student: Alan Danque</a:t>
             </a:r>
           </a:p>
           <a:p>
             <a:pPr algn="l"/>
             <a:r>
-              <a:rPr lang="en-US"/>
+              <a:rPr lang="en-US" dirty="0"/>
               <a:t>Class: DSC 640</a:t>
             </a:r>
           </a:p>
           <a:p>
             <a:pPr algn="l"/>
             <a:r>
-              <a:rPr lang="en-US"/>
+              <a:rPr lang="en-US" dirty="0"/>
               <a:t>Professor: Armstrong</a:t>
             </a:r>
-            <a:endParaRPr lang="en-US" dirty="0"/>
           </a:p>
         </p:txBody>
       </p:sp>

</xml_diff>